<commit_message>
Update benefit evaluation poster.pptx
</commit_message>
<xml_diff>
--- a/benefit evaluation poster.pptx
+++ b/benefit evaluation poster.pptx
@@ -291,7 +291,7 @@
       </p15:notesGuideLst>
     </p:ext>
     <p:ext uri="GoogleSlidesCustomDataVersion2">
-      <go:slidesCustomData xmlns="" xmlns:mc="http://schemas.openxmlformats.org/markup-compatibility/2006" xmlns:mv="urn:schemas-microsoft-com:mac:vml" xmlns:c="http://schemas.openxmlformats.org/drawingml/2006/chart" xmlns:dgm="http://schemas.openxmlformats.org/drawingml/2006/diagram" xmlns:o="urn:schemas-microsoft-com:office:office" xmlns:v="urn:schemas-microsoft-com:vml" xmlns:pvml="urn:schemas-microsoft-com:office:powerpoint" xmlns:com="http://schemas.openxmlformats.org/drawingml/2006/compatibility" xmlns:p14="http://schemas.microsoft.com/office/powerpoint/2010/main" xmlns:p15="http://schemas.microsoft.com/office/powerpoint/2012/main" xmlns:ahyp="http://schemas.microsoft.com/office/drawing/2018/hyperlinkcolor" xmlns:go="http://customooxmlschemas.google.com/" r:id="rId8" roundtripDataSignature="AMtx7mgU1Pp5gbw/J7bLp9/dWTZ3pIcRrA=="/>
+      <go:slidesCustomData xmlns:go="http://customooxmlschemas.google.com/" xmlns:ahyp="http://schemas.microsoft.com/office/drawing/2018/hyperlinkcolor" xmlns:p15="http://schemas.microsoft.com/office/powerpoint/2012/main" xmlns:p14="http://schemas.microsoft.com/office/powerpoint/2010/main" xmlns:com="http://schemas.openxmlformats.org/drawingml/2006/compatibility" xmlns:pvml="urn:schemas-microsoft-com:office:powerpoint" xmlns:v="urn:schemas-microsoft-com:vml" xmlns:o="urn:schemas-microsoft-com:office:office" xmlns:dgm="http://schemas.openxmlformats.org/drawingml/2006/diagram" xmlns:c="http://schemas.openxmlformats.org/drawingml/2006/chart" xmlns:mv="urn:schemas-microsoft-com:mac:vml" xmlns:mc="http://schemas.openxmlformats.org/markup-compatibility/2006" xmlns="" r:id="rId8" roundtripDataSignature="AMtx7mgU1Pp5gbw/J7bLp9/dWTZ3pIcRrA=="/>
     </p:ext>
   </p:extLst>
 </p:presentation>
@@ -9043,7 +9043,7 @@
                 <a:cs typeface="Arial"/>
                 <a:sym typeface="Arial"/>
               </a:rPr>
-              <a:t> Ye</a:t>
+              <a:t> Huang</a:t>
             </a:r>
             <a:r>
               <a:rPr lang="en-US" sz="5500" baseline="30000" dirty="0">
@@ -9105,7 +9105,7 @@
         </p:nvSpPr>
         <p:spPr>
           <a:xfrm>
-            <a:off x="2941350" y="1218388"/>
+            <a:off x="3493887" y="1216367"/>
             <a:ext cx="34125750" cy="1889457"/>
           </a:xfrm>
           <a:prstGeom prst="rect">

</xml_diff>